<commit_message>
Added more stuff to cheat sheet
</commit_message>
<xml_diff>
--- a/docs/CheatSheet.pptx
+++ b/docs/CheatSheet.pptx
@@ -199,7 +199,7 @@
           <a:p>
             <a:fld id="{A426CAC6-4C26-DA42-B260-CA966EDEB8DE}" type="datetimeFigureOut">
               <a:rPr lang="en-US" smtClean="0"/>
-              <a:t>7/1/25</a:t>
+              <a:t>7/2/25</a:t>
             </a:fld>
             <a:endParaRPr lang="en-US" dirty="0"/>
           </a:p>
@@ -865,7 +865,7 @@
           <a:p>
             <a:fld id="{D996798F-AFF2-4140-87AD-54D8021B772D}" type="datetimeFigureOut">
               <a:rPr lang="en-US" smtClean="0"/>
-              <a:t>7/1/25</a:t>
+              <a:t>7/2/25</a:t>
             </a:fld>
             <a:endParaRPr lang="en-US" dirty="0"/>
           </a:p>
@@ -1063,7 +1063,7 @@
           <a:p>
             <a:fld id="{D996798F-AFF2-4140-87AD-54D8021B772D}" type="datetimeFigureOut">
               <a:rPr lang="en-US" smtClean="0"/>
-              <a:t>7/1/25</a:t>
+              <a:t>7/2/25</a:t>
             </a:fld>
             <a:endParaRPr lang="en-US" dirty="0"/>
           </a:p>
@@ -1271,7 +1271,7 @@
           <a:p>
             <a:fld id="{D996798F-AFF2-4140-87AD-54D8021B772D}" type="datetimeFigureOut">
               <a:rPr lang="en-US" smtClean="0"/>
-              <a:t>7/1/25</a:t>
+              <a:t>7/2/25</a:t>
             </a:fld>
             <a:endParaRPr lang="en-US" dirty="0"/>
           </a:p>
@@ -1469,7 +1469,7 @@
           <a:p>
             <a:fld id="{D996798F-AFF2-4140-87AD-54D8021B772D}" type="datetimeFigureOut">
               <a:rPr lang="en-US" smtClean="0"/>
-              <a:t>7/1/25</a:t>
+              <a:t>7/2/25</a:t>
             </a:fld>
             <a:endParaRPr lang="en-US" dirty="0"/>
           </a:p>
@@ -1744,7 +1744,7 @@
           <a:p>
             <a:fld id="{D996798F-AFF2-4140-87AD-54D8021B772D}" type="datetimeFigureOut">
               <a:rPr lang="en-US" smtClean="0"/>
-              <a:t>7/1/25</a:t>
+              <a:t>7/2/25</a:t>
             </a:fld>
             <a:endParaRPr lang="en-US" dirty="0"/>
           </a:p>
@@ -2009,7 +2009,7 @@
           <a:p>
             <a:fld id="{D996798F-AFF2-4140-87AD-54D8021B772D}" type="datetimeFigureOut">
               <a:rPr lang="en-US" smtClean="0"/>
-              <a:t>7/1/25</a:t>
+              <a:t>7/2/25</a:t>
             </a:fld>
             <a:endParaRPr lang="en-US" dirty="0"/>
           </a:p>
@@ -2421,7 +2421,7 @@
           <a:p>
             <a:fld id="{D996798F-AFF2-4140-87AD-54D8021B772D}" type="datetimeFigureOut">
               <a:rPr lang="en-US" smtClean="0"/>
-              <a:t>7/1/25</a:t>
+              <a:t>7/2/25</a:t>
             </a:fld>
             <a:endParaRPr lang="en-US" dirty="0"/>
           </a:p>
@@ -2562,7 +2562,7 @@
           <a:p>
             <a:fld id="{D996798F-AFF2-4140-87AD-54D8021B772D}" type="datetimeFigureOut">
               <a:rPr lang="en-US" smtClean="0"/>
-              <a:t>7/1/25</a:t>
+              <a:t>7/2/25</a:t>
             </a:fld>
             <a:endParaRPr lang="en-US" dirty="0"/>
           </a:p>
@@ -2675,7 +2675,7 @@
           <a:p>
             <a:fld id="{D996798F-AFF2-4140-87AD-54D8021B772D}" type="datetimeFigureOut">
               <a:rPr lang="en-US" smtClean="0"/>
-              <a:t>7/1/25</a:t>
+              <a:t>7/2/25</a:t>
             </a:fld>
             <a:endParaRPr lang="en-US" dirty="0"/>
           </a:p>
@@ -2986,7 +2986,7 @@
           <a:p>
             <a:fld id="{D996798F-AFF2-4140-87AD-54D8021B772D}" type="datetimeFigureOut">
               <a:rPr lang="en-US" smtClean="0"/>
-              <a:t>7/1/25</a:t>
+              <a:t>7/2/25</a:t>
             </a:fld>
             <a:endParaRPr lang="en-US" dirty="0"/>
           </a:p>
@@ -3274,7 +3274,7 @@
           <a:p>
             <a:fld id="{D996798F-AFF2-4140-87AD-54D8021B772D}" type="datetimeFigureOut">
               <a:rPr lang="en-US" smtClean="0"/>
-              <a:t>7/1/25</a:t>
+              <a:t>7/2/25</a:t>
             </a:fld>
             <a:endParaRPr lang="en-US" dirty="0"/>
           </a:p>
@@ -3515,7 +3515,7 @@
           <a:p>
             <a:fld id="{D996798F-AFF2-4140-87AD-54D8021B772D}" type="datetimeFigureOut">
               <a:rPr lang="en-US" smtClean="0"/>
-              <a:t>7/1/25</a:t>
+              <a:t>7/2/25</a:t>
             </a:fld>
             <a:endParaRPr lang="en-US" dirty="0"/>
           </a:p>
@@ -3973,9 +3973,9 @@
               <a:avLst/>
             </a:prstGeom>
             <a:solidFill>
-              <a:schemeClr val="accent1">
-                <a:lumMod val="40000"/>
-                <a:lumOff val="60000"/>
+              <a:schemeClr val="tx2">
+                <a:lumMod val="50000"/>
+                <a:lumOff val="50000"/>
               </a:schemeClr>
             </a:solidFill>
             <a:ln>
@@ -4240,10 +4240,10 @@
         </p:nvGrpSpPr>
         <p:grpSpPr>
           <a:xfrm>
-            <a:off x="396207" y="3289149"/>
-            <a:ext cx="2248133" cy="3037521"/>
-            <a:chOff x="8811186" y="125809"/>
-            <a:chExt cx="2248133" cy="3037521"/>
+            <a:off x="350487" y="3289149"/>
+            <a:ext cx="2248133" cy="3028377"/>
+            <a:chOff x="8765466" y="125809"/>
+            <a:chExt cx="2248133" cy="3028377"/>
           </a:xfrm>
         </p:grpSpPr>
         <p:sp>
@@ -4267,9 +4267,9 @@
               <a:avLst/>
             </a:prstGeom>
             <a:solidFill>
-              <a:schemeClr val="accent1">
-                <a:lumMod val="40000"/>
-                <a:lumOff val="60000"/>
+              <a:schemeClr val="tx2">
+                <a:lumMod val="50000"/>
+                <a:lumOff val="50000"/>
               </a:schemeClr>
             </a:solidFill>
             <a:ln>
@@ -4325,7 +4325,7 @@
           </p:nvSpPr>
           <p:spPr>
             <a:xfrm>
-              <a:off x="8811186" y="558107"/>
+              <a:off x="8765466" y="548963"/>
               <a:ext cx="2248133" cy="2605223"/>
             </a:xfrm>
             <a:prstGeom prst="heptagon">
@@ -4626,9 +4626,9 @@
         <p:grpSpPr>
           <a:xfrm>
             <a:off x="120516" y="142290"/>
-            <a:ext cx="4426772" cy="2521510"/>
+            <a:ext cx="4266470" cy="2490732"/>
             <a:chOff x="207015" y="142290"/>
-            <a:chExt cx="4426772" cy="2521510"/>
+            <a:chExt cx="4266470" cy="2490732"/>
           </a:xfrm>
         </p:grpSpPr>
         <p:sp>
@@ -4652,9 +4652,9 @@
               <a:avLst/>
             </a:prstGeom>
             <a:solidFill>
-              <a:schemeClr val="accent1">
-                <a:lumMod val="40000"/>
-                <a:lumOff val="60000"/>
+              <a:schemeClr val="tx2">
+                <a:lumMod val="50000"/>
+                <a:lumOff val="50000"/>
               </a:schemeClr>
             </a:solidFill>
             <a:ln>
@@ -4711,9 +4711,9 @@
           <p:grpSpPr>
             <a:xfrm>
               <a:off x="969434" y="778472"/>
-              <a:ext cx="3664353" cy="1885328"/>
+              <a:ext cx="3504051" cy="1854550"/>
               <a:chOff x="734651" y="778472"/>
-              <a:chExt cx="3664353" cy="1885328"/>
+              <a:chExt cx="3504051" cy="1854550"/>
             </a:xfrm>
           </p:grpSpPr>
           <p:sp>
@@ -5548,8 +5548,8 @@
             </p:nvSpPr>
             <p:spPr>
               <a:xfrm>
-                <a:off x="3022025" y="1449858"/>
-                <a:ext cx="1376979" cy="307777"/>
+                <a:off x="3022026" y="1449858"/>
+                <a:ext cx="1216676" cy="276999"/>
               </a:xfrm>
               <a:prstGeom prst="rect">
                 <a:avLst/>
@@ -5563,7 +5563,10 @@
               <a:lstStyle/>
               <a:p>
                 <a:r>
-                  <a:rPr lang="en-US" sz="1400" dirty="0"/>
+                  <a:rPr lang="en-US" sz="1200" dirty="0">
+                    <a:latin typeface="Aptos Serif" panose="02020604070405020304" pitchFamily="18" charset="0"/>
+                    <a:cs typeface="Aptos Serif" panose="02020604070405020304" pitchFamily="18" charset="0"/>
+                  </a:rPr>
                   <a:t>Observations</a:t>
                 </a:r>
               </a:p>
@@ -5584,9 +5587,9 @@
             <p:grpSpPr>
               <a:xfrm>
                 <a:off x="734651" y="2022393"/>
-                <a:ext cx="1888419" cy="641407"/>
+                <a:ext cx="1888419" cy="610629"/>
                 <a:chOff x="228024" y="1849395"/>
-                <a:chExt cx="1703746" cy="641407"/>
+                <a:chExt cx="1703746" cy="610629"/>
               </a:xfrm>
             </p:grpSpPr>
             <p:sp>
@@ -5647,8 +5650,8 @@
               </p:nvSpPr>
               <p:spPr>
                 <a:xfrm>
-                  <a:off x="650792" y="2183025"/>
-                  <a:ext cx="897916" cy="307777"/>
+                  <a:off x="709720" y="2183025"/>
+                  <a:ext cx="813624" cy="276999"/>
                 </a:xfrm>
                 <a:prstGeom prst="rect">
                   <a:avLst/>
@@ -5662,7 +5665,10 @@
                 <a:lstStyle/>
                 <a:p>
                   <a:r>
-                    <a:rPr lang="en-US" sz="1400" dirty="0"/>
+                    <a:rPr lang="en-US" sz="1200" dirty="0">
+                      <a:latin typeface="Aptos Serif" panose="02020604070405020304" pitchFamily="18" charset="0"/>
+                      <a:cs typeface="Aptos Serif" panose="02020604070405020304" pitchFamily="18" charset="0"/>
+                    </a:rPr>
                     <a:t>Variables</a:t>
                   </a:r>
                 </a:p>
@@ -5996,9 +6002,9 @@
               <a:avLst/>
             </a:prstGeom>
             <a:solidFill>
-              <a:schemeClr val="accent1">
-                <a:lumMod val="40000"/>
-                <a:lumOff val="60000"/>
+              <a:schemeClr val="tx2">
+                <a:lumMod val="50000"/>
+                <a:lumOff val="50000"/>
               </a:schemeClr>
             </a:solidFill>
             <a:ln>
@@ -6061,9 +6067,9 @@
               <a:avLst/>
             </a:prstGeom>
             <a:solidFill>
-              <a:schemeClr val="tx2">
-                <a:lumMod val="10000"/>
-                <a:lumOff val="90000"/>
+              <a:schemeClr val="accent1">
+                <a:lumMod val="20000"/>
+                <a:lumOff val="80000"/>
               </a:schemeClr>
             </a:solidFill>
             <a:scene3d>
@@ -6236,9 +6242,9 @@
               <a:avLst/>
             </a:prstGeom>
             <a:solidFill>
-              <a:schemeClr val="accent1">
-                <a:lumMod val="40000"/>
-                <a:lumOff val="60000"/>
+              <a:schemeClr val="tx2">
+                <a:lumMod val="50000"/>
+                <a:lumOff val="50000"/>
               </a:schemeClr>
             </a:solidFill>
             <a:ln>
@@ -6301,9 +6307,9 @@
               <a:avLst/>
             </a:prstGeom>
             <a:solidFill>
-              <a:schemeClr val="tx2">
-                <a:lumMod val="10000"/>
-                <a:lumOff val="90000"/>
+              <a:schemeClr val="accent1">
+                <a:lumMod val="20000"/>
+                <a:lumOff val="80000"/>
               </a:schemeClr>
             </a:solidFill>
             <a:ln>
@@ -7196,9 +7202,9 @@
               <a:avLst/>
             </a:prstGeom>
             <a:solidFill>
-              <a:schemeClr val="accent1">
-                <a:lumMod val="40000"/>
-                <a:lumOff val="60000"/>
+              <a:schemeClr val="tx2">
+                <a:lumMod val="50000"/>
+                <a:lumOff val="50000"/>
               </a:schemeClr>
             </a:solidFill>
             <a:ln>
@@ -8186,9 +8192,9 @@
               <a:avLst/>
             </a:prstGeom>
             <a:solidFill>
-              <a:schemeClr val="accent1">
-                <a:lumMod val="40000"/>
-                <a:lumOff val="60000"/>
+              <a:schemeClr val="tx2">
+                <a:lumMod val="50000"/>
+                <a:lumOff val="50000"/>
               </a:schemeClr>
             </a:solidFill>
             <a:ln>
@@ -9309,9 +9315,9 @@
               <a:avLst/>
             </a:prstGeom>
             <a:solidFill>
-              <a:schemeClr val="accent1">
-                <a:lumMod val="40000"/>
-                <a:lumOff val="60000"/>
+              <a:schemeClr val="tx2">
+                <a:lumMod val="50000"/>
+                <a:lumOff val="50000"/>
               </a:schemeClr>
             </a:solidFill>
             <a:ln>
@@ -9374,9 +9380,9 @@
               <a:avLst/>
             </a:prstGeom>
             <a:solidFill>
-              <a:schemeClr val="tx2">
-                <a:lumMod val="10000"/>
-                <a:lumOff val="90000"/>
+              <a:schemeClr val="accent1">
+                <a:lumMod val="20000"/>
+                <a:lumOff val="80000"/>
               </a:schemeClr>
             </a:solidFill>
             <a:ln>
@@ -9792,9 +9798,9 @@
               <a:avLst/>
             </a:prstGeom>
             <a:solidFill>
-              <a:schemeClr val="accent1">
-                <a:lumMod val="40000"/>
-                <a:lumOff val="60000"/>
+              <a:schemeClr val="tx2">
+                <a:lumMod val="50000"/>
+                <a:lumOff val="50000"/>
               </a:schemeClr>
             </a:solidFill>
             <a:ln>
@@ -10384,9 +10390,9 @@
               <a:avLst/>
             </a:prstGeom>
             <a:solidFill>
-              <a:schemeClr val="accent1">
-                <a:lumMod val="40000"/>
-                <a:lumOff val="60000"/>
+              <a:schemeClr val="tx2">
+                <a:lumMod val="50000"/>
+                <a:lumOff val="50000"/>
               </a:schemeClr>
             </a:solidFill>
             <a:ln>
@@ -10585,9 +10591,9 @@
                 <a:avLst/>
               </a:prstGeom>
               <a:solidFill>
-                <a:schemeClr val="tx2">
-                  <a:lumMod val="10000"/>
-                  <a:lumOff val="90000"/>
+                <a:schemeClr val="accent1">
+                  <a:lumMod val="20000"/>
+                  <a:lumOff val="80000"/>
                 </a:schemeClr>
               </a:solidFill>
               <a:ln>
@@ -10848,9 +10854,9 @@
                 <a:avLst/>
               </a:prstGeom>
               <a:solidFill>
-                <a:schemeClr val="tx2">
-                  <a:lumMod val="10000"/>
-                  <a:lumOff val="90000"/>
+                <a:schemeClr val="accent1">
+                  <a:lumMod val="20000"/>
+                  <a:lumOff val="80000"/>
                 </a:schemeClr>
               </a:solidFill>
               <a:ln>
@@ -11102,9 +11108,9 @@
                 <a:avLst/>
               </a:prstGeom>
               <a:solidFill>
-                <a:schemeClr val="tx2">
-                  <a:lumMod val="10000"/>
-                  <a:lumOff val="90000"/>
+                <a:schemeClr val="accent1">
+                  <a:lumMod val="20000"/>
+                  <a:lumOff val="80000"/>
                 </a:schemeClr>
               </a:solidFill>
               <a:ln>
@@ -11292,9 +11298,9 @@
               <a:avLst/>
             </a:prstGeom>
             <a:solidFill>
-              <a:schemeClr val="accent1">
-                <a:lumMod val="40000"/>
-                <a:lumOff val="60000"/>
+              <a:schemeClr val="tx2">
+                <a:lumMod val="50000"/>
+                <a:lumOff val="50000"/>
               </a:schemeClr>
             </a:solidFill>
             <a:ln>
@@ -11377,9 +11383,9 @@
                 <a:avLst/>
               </a:prstGeom>
               <a:solidFill>
-                <a:schemeClr val="tx2">
-                  <a:lumMod val="10000"/>
-                  <a:lumOff val="90000"/>
+                <a:schemeClr val="accent1">
+                  <a:lumMod val="20000"/>
+                  <a:lumOff val="80000"/>
                 </a:schemeClr>
               </a:solidFill>
               <a:ln>
@@ -11645,9 +11651,9 @@
                 <a:avLst/>
               </a:prstGeom>
               <a:solidFill>
-                <a:schemeClr val="tx2">
-                  <a:lumMod val="10000"/>
-                  <a:lumOff val="90000"/>
+                <a:schemeClr val="accent1">
+                  <a:lumMod val="20000"/>
+                  <a:lumOff val="80000"/>
                 </a:schemeClr>
               </a:solidFill>
               <a:ln>
@@ -11933,9 +11939,9 @@
                 <a:avLst/>
               </a:prstGeom>
               <a:solidFill>
-                <a:schemeClr val="tx2">
-                  <a:lumMod val="10000"/>
-                  <a:lumOff val="90000"/>
+                <a:schemeClr val="accent1">
+                  <a:lumMod val="20000"/>
+                  <a:lumOff val="80000"/>
                 </a:schemeClr>
               </a:solidFill>
               <a:ln>
@@ -12293,6 +12299,13 @@
           <a:prstGeom prst="rect">
             <a:avLst/>
           </a:prstGeom>
+          <a:scene3d>
+            <a:camera prst="orthographicFront"/>
+            <a:lightRig rig="threePt" dir="t"/>
+          </a:scene3d>
+          <a:sp3d>
+            <a:bevelT/>
+          </a:sp3d>
         </p:spPr>
       </p:pic>
       <p:sp>
@@ -12398,9 +12411,9 @@
               <a:avLst/>
             </a:prstGeom>
             <a:solidFill>
-              <a:schemeClr val="accent1">
-                <a:lumMod val="40000"/>
-                <a:lumOff val="60000"/>
+              <a:schemeClr val="tx2">
+                <a:lumMod val="50000"/>
+                <a:lumOff val="50000"/>
               </a:schemeClr>
             </a:solidFill>
             <a:ln>
@@ -12622,9 +12635,9 @@
                 <a:avLst/>
               </a:prstGeom>
               <a:solidFill>
-                <a:schemeClr val="tx2">
-                  <a:lumMod val="10000"/>
-                  <a:lumOff val="90000"/>
+                <a:schemeClr val="accent1">
+                  <a:lumMod val="20000"/>
+                  <a:lumOff val="80000"/>
                 </a:schemeClr>
               </a:solidFill>
               <a:ln>
@@ -12901,9 +12914,9 @@
                 <a:avLst/>
               </a:prstGeom>
               <a:solidFill>
-                <a:schemeClr val="tx2">
-                  <a:lumMod val="10000"/>
-                  <a:lumOff val="90000"/>
+                <a:schemeClr val="accent1">
+                  <a:lumMod val="20000"/>
+                  <a:lumOff val="80000"/>
                 </a:schemeClr>
               </a:solidFill>
               <a:ln>
@@ -13166,9 +13179,9 @@
                 <a:avLst/>
               </a:prstGeom>
               <a:solidFill>
-                <a:schemeClr val="tx2">
-                  <a:lumMod val="10000"/>
-                  <a:lumOff val="90000"/>
+                <a:schemeClr val="accent1">
+                  <a:lumMod val="20000"/>
+                  <a:lumOff val="80000"/>
                 </a:schemeClr>
               </a:solidFill>
               <a:ln>

</xml_diff>

<commit_message>
Added to cheat sheet
</commit_message>
<xml_diff>
--- a/docs/CheatSheet.pptx
+++ b/docs/CheatSheet.pptx
@@ -199,7 +199,7 @@
           <a:p>
             <a:fld id="{A426CAC6-4C26-DA42-B260-CA966EDEB8DE}" type="datetimeFigureOut">
               <a:rPr lang="en-US" smtClean="0"/>
-              <a:t>7/2/25</a:t>
+              <a:t>7/3/25</a:t>
             </a:fld>
             <a:endParaRPr lang="en-US" dirty="0"/>
           </a:p>
@@ -865,7 +865,7 @@
           <a:p>
             <a:fld id="{D996798F-AFF2-4140-87AD-54D8021B772D}" type="datetimeFigureOut">
               <a:rPr lang="en-US" smtClean="0"/>
-              <a:t>7/2/25</a:t>
+              <a:t>7/3/25</a:t>
             </a:fld>
             <a:endParaRPr lang="en-US" dirty="0"/>
           </a:p>
@@ -1063,7 +1063,7 @@
           <a:p>
             <a:fld id="{D996798F-AFF2-4140-87AD-54D8021B772D}" type="datetimeFigureOut">
               <a:rPr lang="en-US" smtClean="0"/>
-              <a:t>7/2/25</a:t>
+              <a:t>7/3/25</a:t>
             </a:fld>
             <a:endParaRPr lang="en-US" dirty="0"/>
           </a:p>
@@ -1271,7 +1271,7 @@
           <a:p>
             <a:fld id="{D996798F-AFF2-4140-87AD-54D8021B772D}" type="datetimeFigureOut">
               <a:rPr lang="en-US" smtClean="0"/>
-              <a:t>7/2/25</a:t>
+              <a:t>7/3/25</a:t>
             </a:fld>
             <a:endParaRPr lang="en-US" dirty="0"/>
           </a:p>
@@ -1469,7 +1469,7 @@
           <a:p>
             <a:fld id="{D996798F-AFF2-4140-87AD-54D8021B772D}" type="datetimeFigureOut">
               <a:rPr lang="en-US" smtClean="0"/>
-              <a:t>7/2/25</a:t>
+              <a:t>7/3/25</a:t>
             </a:fld>
             <a:endParaRPr lang="en-US" dirty="0"/>
           </a:p>
@@ -1744,7 +1744,7 @@
           <a:p>
             <a:fld id="{D996798F-AFF2-4140-87AD-54D8021B772D}" type="datetimeFigureOut">
               <a:rPr lang="en-US" smtClean="0"/>
-              <a:t>7/2/25</a:t>
+              <a:t>7/3/25</a:t>
             </a:fld>
             <a:endParaRPr lang="en-US" dirty="0"/>
           </a:p>
@@ -2009,7 +2009,7 @@
           <a:p>
             <a:fld id="{D996798F-AFF2-4140-87AD-54D8021B772D}" type="datetimeFigureOut">
               <a:rPr lang="en-US" smtClean="0"/>
-              <a:t>7/2/25</a:t>
+              <a:t>7/3/25</a:t>
             </a:fld>
             <a:endParaRPr lang="en-US" dirty="0"/>
           </a:p>
@@ -2421,7 +2421,7 @@
           <a:p>
             <a:fld id="{D996798F-AFF2-4140-87AD-54D8021B772D}" type="datetimeFigureOut">
               <a:rPr lang="en-US" smtClean="0"/>
-              <a:t>7/2/25</a:t>
+              <a:t>7/3/25</a:t>
             </a:fld>
             <a:endParaRPr lang="en-US" dirty="0"/>
           </a:p>
@@ -2562,7 +2562,7 @@
           <a:p>
             <a:fld id="{D996798F-AFF2-4140-87AD-54D8021B772D}" type="datetimeFigureOut">
               <a:rPr lang="en-US" smtClean="0"/>
-              <a:t>7/2/25</a:t>
+              <a:t>7/3/25</a:t>
             </a:fld>
             <a:endParaRPr lang="en-US" dirty="0"/>
           </a:p>
@@ -2675,7 +2675,7 @@
           <a:p>
             <a:fld id="{D996798F-AFF2-4140-87AD-54D8021B772D}" type="datetimeFigureOut">
               <a:rPr lang="en-US" smtClean="0"/>
-              <a:t>7/2/25</a:t>
+              <a:t>7/3/25</a:t>
             </a:fld>
             <a:endParaRPr lang="en-US" dirty="0"/>
           </a:p>
@@ -2986,7 +2986,7 @@
           <a:p>
             <a:fld id="{D996798F-AFF2-4140-87AD-54D8021B772D}" type="datetimeFigureOut">
               <a:rPr lang="en-US" smtClean="0"/>
-              <a:t>7/2/25</a:t>
+              <a:t>7/3/25</a:t>
             </a:fld>
             <a:endParaRPr lang="en-US" dirty="0"/>
           </a:p>
@@ -3274,7 +3274,7 @@
           <a:p>
             <a:fld id="{D996798F-AFF2-4140-87AD-54D8021B772D}" type="datetimeFigureOut">
               <a:rPr lang="en-US" smtClean="0"/>
-              <a:t>7/2/25</a:t>
+              <a:t>7/3/25</a:t>
             </a:fld>
             <a:endParaRPr lang="en-US" dirty="0"/>
           </a:p>
@@ -3515,7 +3515,7 @@
           <a:p>
             <a:fld id="{D996798F-AFF2-4140-87AD-54D8021B772D}" type="datetimeFigureOut">
               <a:rPr lang="en-US" smtClean="0"/>
-              <a:t>7/2/25</a:t>
+              <a:t>7/3/25</a:t>
             </a:fld>
             <a:endParaRPr lang="en-US" dirty="0"/>
           </a:p>
@@ -4213,7 +4213,7 @@
                   <a:cs typeface="Aptos Serif" panose="020B0604020202020204" pitchFamily="34" charset="0"/>
                   <a:hlinkClick r:id="rId6"/>
                 </a:rPr>
-                <a:t>read&lt;…&gt;(…);</a:t>
+                <a:t>read(…);</a:t>
               </a:r>
               <a:endParaRPr lang="en-US" sz="1200" b="1" dirty="0">
                 <a:solidFill>
@@ -12208,72 +12208,9 @@
           </p:sp>
         </p:grpSp>
       </p:grpSp>
-      <p:sp>
-        <p:nvSpPr>
-          <p:cNvPr id="14" name="TextBox 13">
-            <a:extLst>
-              <a:ext uri="{FF2B5EF4-FFF2-40B4-BE49-F238E27FC236}">
-                <a16:creationId xmlns:a16="http://schemas.microsoft.com/office/drawing/2014/main" id="{428C4C21-60F5-A2FC-5D04-47045E913BEA}"/>
-              </a:ext>
-            </a:extLst>
-          </p:cNvPr>
-          <p:cNvSpPr txBox="1"/>
-          <p:nvPr/>
-        </p:nvSpPr>
-        <p:spPr>
-          <a:xfrm>
-            <a:off x="111287" y="5721534"/>
-            <a:ext cx="3716129" cy="954107"/>
-          </a:xfrm>
-          <a:prstGeom prst="rect">
-            <a:avLst/>
-          </a:prstGeom>
-          <a:noFill/>
-        </p:spPr>
-        <p:txBody>
-          <a:bodyPr wrap="square" rtlCol="0">
-            <a:spAutoFit/>
-          </a:bodyPr>
-          <a:lstStyle/>
-          <a:p>
-            <a:r>
-              <a:rPr lang="en-US" sz="2800" b="1" dirty="0">
-                <a:solidFill>
-                  <a:schemeClr val="accent2">
-                    <a:lumMod val="75000"/>
-                  </a:schemeClr>
-                </a:solidFill>
-                <a:latin typeface="American Typewriter Condensed" panose="02090606020004020304" pitchFamily="18" charset="77"/>
-              </a:rPr>
-              <a:t>Full Documentation with Code Samples are </a:t>
-            </a:r>
-            <a:r>
-              <a:rPr lang="en-US" sz="2800" b="1" dirty="0">
-                <a:solidFill>
-                  <a:schemeClr val="accent2">
-                    <a:lumMod val="75000"/>
-                  </a:schemeClr>
-                </a:solidFill>
-                <a:latin typeface="American Typewriter Condensed" panose="02090606020004020304" pitchFamily="18" charset="77"/>
-                <a:hlinkClick r:id="rId13"/>
-              </a:rPr>
-              <a:t>Here</a:t>
-            </a:r>
-            <a:endParaRPr lang="en-US" sz="2800" b="1" dirty="0">
-              <a:solidFill>
-                <a:schemeClr val="accent2">
-                  <a:lumMod val="75000"/>
-                </a:schemeClr>
-              </a:solidFill>
-              <a:latin typeface="American Typewriter Condensed" panose="02090606020004020304" pitchFamily="18" charset="77"/>
-            </a:endParaRPr>
-          </a:p>
-        </p:txBody>
-      </p:sp>
       <p:pic>
         <p:nvPicPr>
           <p:cNvPr id="17" name="Picture 16" descr="A close up of a lion&#10;&#10;AI-generated content may be incorrect.">
-            <a:hlinkClick r:id="rId14"/>
             <a:extLst>
               <a:ext uri="{FF2B5EF4-FFF2-40B4-BE49-F238E27FC236}">
                 <a16:creationId xmlns:a16="http://schemas.microsoft.com/office/drawing/2014/main" id="{D9081641-76BC-9044-C0A8-432C3C665EEE}"/>
@@ -12286,7 +12223,7 @@
           <p:nvPr/>
         </p:nvPicPr>
         <p:blipFill>
-          <a:blip r:embed="rId15"/>
+          <a:blip r:embed="rId13"/>
           <a:stretch>
             <a:fillRect/>
           </a:stretch>
@@ -12304,72 +12241,155 @@
             <a:lightRig rig="threePt" dir="t"/>
           </a:scene3d>
           <a:sp3d>
-            <a:bevelT/>
+            <a:bevelT w="165100" prst="coolSlant"/>
           </a:sp3d>
         </p:spPr>
       </p:pic>
-      <p:sp>
-        <p:nvSpPr>
-          <p:cNvPr id="18" name="TextBox 17">
+      <p:grpSp>
+        <p:nvGrpSpPr>
+          <p:cNvPr id="2" name="Group 1">
             <a:extLst>
               <a:ext uri="{FF2B5EF4-FFF2-40B4-BE49-F238E27FC236}">
-                <a16:creationId xmlns:a16="http://schemas.microsoft.com/office/drawing/2014/main" id="{7D2B9645-3BB7-4C0D-6190-80D4832CAC4E}"/>
+                <a16:creationId xmlns:a16="http://schemas.microsoft.com/office/drawing/2014/main" id="{2B0EFBA6-CCE5-5A0A-A625-5A3EC8E0A814}"/>
               </a:ext>
             </a:extLst>
           </p:cNvPr>
-          <p:cNvSpPr txBox="1"/>
+          <p:cNvGrpSpPr/>
           <p:nvPr/>
-        </p:nvSpPr>
-        <p:spPr>
+        </p:nvGrpSpPr>
+        <p:grpSpPr>
           <a:xfrm>
             <a:off x="106931" y="5050973"/>
-            <a:ext cx="3716129" cy="523220"/>
+            <a:ext cx="3720485" cy="1624668"/>
+            <a:chOff x="106931" y="5050973"/>
+            <a:chExt cx="3720485" cy="1624668"/>
           </a:xfrm>
-          <a:prstGeom prst="rect">
-            <a:avLst/>
-          </a:prstGeom>
-          <a:noFill/>
-        </p:spPr>
-        <p:txBody>
-          <a:bodyPr wrap="square" rtlCol="0">
-            <a:spAutoFit/>
-          </a:bodyPr>
-          <a:lstStyle/>
-          <a:p>
-            <a:r>
-              <a:rPr lang="en-US" sz="2800" b="1" dirty="0">
+        </p:grpSpPr>
+        <p:sp>
+          <p:nvSpPr>
+            <p:cNvPr id="14" name="TextBox 13">
+              <a:extLst>
+                <a:ext uri="{FF2B5EF4-FFF2-40B4-BE49-F238E27FC236}">
+                  <a16:creationId xmlns:a16="http://schemas.microsoft.com/office/drawing/2014/main" id="{428C4C21-60F5-A2FC-5D04-47045E913BEA}"/>
+                </a:ext>
+              </a:extLst>
+            </p:cNvPr>
+            <p:cNvSpPr txBox="1"/>
+            <p:nvPr/>
+          </p:nvSpPr>
+          <p:spPr>
+            <a:xfrm>
+              <a:off x="111287" y="5721534"/>
+              <a:ext cx="3716129" cy="954107"/>
+            </a:xfrm>
+            <a:prstGeom prst="rect">
+              <a:avLst/>
+            </a:prstGeom>
+            <a:noFill/>
+          </p:spPr>
+          <p:txBody>
+            <a:bodyPr wrap="square" rtlCol="0">
+              <a:spAutoFit/>
+            </a:bodyPr>
+            <a:lstStyle/>
+            <a:p>
+              <a:r>
+                <a:rPr lang="en-US" sz="2800" b="1" dirty="0">
+                  <a:solidFill>
+                    <a:schemeClr val="accent2">
+                      <a:lumMod val="75000"/>
+                    </a:schemeClr>
+                  </a:solidFill>
+                  <a:latin typeface="American Typewriter Condensed" panose="02090606020004020304" pitchFamily="18" charset="77"/>
+                </a:rPr>
+                <a:t>Full Documentation with Code Samples are </a:t>
+              </a:r>
+              <a:r>
+                <a:rPr lang="en-US" sz="2800" b="1" dirty="0">
+                  <a:solidFill>
+                    <a:schemeClr val="accent2">
+                      <a:lumMod val="75000"/>
+                    </a:schemeClr>
+                  </a:solidFill>
+                  <a:latin typeface="American Typewriter Condensed" panose="02090606020004020304" pitchFamily="18" charset="77"/>
+                  <a:hlinkClick r:id="rId14"/>
+                </a:rPr>
+                <a:t>Here</a:t>
+              </a:r>
+              <a:endParaRPr lang="en-US" sz="2800" b="1" dirty="0">
                 <a:solidFill>
                   <a:schemeClr val="accent2">
                     <a:lumMod val="75000"/>
                   </a:schemeClr>
                 </a:solidFill>
                 <a:latin typeface="American Typewriter Condensed" panose="02090606020004020304" pitchFamily="18" charset="77"/>
-              </a:rPr>
-              <a:t>Hello World is </a:t>
-            </a:r>
-            <a:r>
-              <a:rPr lang="en-US" sz="2800" b="1" dirty="0">
+              </a:endParaRPr>
+            </a:p>
+          </p:txBody>
+        </p:sp>
+        <p:sp>
+          <p:nvSpPr>
+            <p:cNvPr id="18" name="TextBox 17">
+              <a:extLst>
+                <a:ext uri="{FF2B5EF4-FFF2-40B4-BE49-F238E27FC236}">
+                  <a16:creationId xmlns:a16="http://schemas.microsoft.com/office/drawing/2014/main" id="{7D2B9645-3BB7-4C0D-6190-80D4832CAC4E}"/>
+                </a:ext>
+              </a:extLst>
+            </p:cNvPr>
+            <p:cNvSpPr txBox="1"/>
+            <p:nvPr/>
+          </p:nvSpPr>
+          <p:spPr>
+            <a:xfrm>
+              <a:off x="106931" y="5050973"/>
+              <a:ext cx="3716129" cy="523220"/>
+            </a:xfrm>
+            <a:prstGeom prst="rect">
+              <a:avLst/>
+            </a:prstGeom>
+            <a:noFill/>
+          </p:spPr>
+          <p:txBody>
+            <a:bodyPr wrap="square" rtlCol="0">
+              <a:spAutoFit/>
+            </a:bodyPr>
+            <a:lstStyle/>
+            <a:p>
+              <a:r>
+                <a:rPr lang="en-US" sz="2800" b="1" dirty="0">
+                  <a:solidFill>
+                    <a:schemeClr val="accent2">
+                      <a:lumMod val="75000"/>
+                    </a:schemeClr>
+                  </a:solidFill>
+                  <a:latin typeface="American Typewriter Condensed" panose="02090606020004020304" pitchFamily="18" charset="77"/>
+                </a:rPr>
+                <a:t>Hello World is </a:t>
+              </a:r>
+              <a:r>
+                <a:rPr lang="en-US" sz="2800" b="1" dirty="0">
+                  <a:solidFill>
+                    <a:schemeClr val="accent2">
+                      <a:lumMod val="75000"/>
+                    </a:schemeClr>
+                  </a:solidFill>
+                  <a:latin typeface="American Typewriter Condensed" panose="02090606020004020304" pitchFamily="18" charset="77"/>
+                  <a:hlinkClick r:id="rId15"/>
+                </a:rPr>
+                <a:t>Here</a:t>
+              </a:r>
+              <a:endParaRPr lang="en-US" sz="2800" b="1" dirty="0">
                 <a:solidFill>
                   <a:schemeClr val="accent2">
                     <a:lumMod val="75000"/>
                   </a:schemeClr>
                 </a:solidFill>
                 <a:latin typeface="American Typewriter Condensed" panose="02090606020004020304" pitchFamily="18" charset="77"/>
-                <a:hlinkClick r:id="rId16"/>
-              </a:rPr>
-              <a:t>Here</a:t>
-            </a:r>
-            <a:endParaRPr lang="en-US" sz="2800" b="1" dirty="0">
-              <a:solidFill>
-                <a:schemeClr val="accent2">
-                  <a:lumMod val="75000"/>
-                </a:schemeClr>
-              </a:solidFill>
-              <a:latin typeface="American Typewriter Condensed" panose="02090606020004020304" pitchFamily="18" charset="77"/>
-            </a:endParaRPr>
-          </a:p>
-        </p:txBody>
-      </p:sp>
+              </a:endParaRPr>
+            </a:p>
+          </p:txBody>
+        </p:sp>
+      </p:grpSp>
       <p:grpSp>
         <p:nvGrpSpPr>
           <p:cNvPr id="33" name="Group 32">
@@ -12541,7 +12561,7 @@
                     </a:solidFill>
                     <a:latin typeface="Aptos Serif" panose="02020604070405020304" pitchFamily="18" charset="0"/>
                     <a:cs typeface="Aptos Serif" panose="02020604070405020304" pitchFamily="18" charset="0"/>
-                    <a:hlinkClick r:id="rId17"/>
+                    <a:hlinkClick r:id="rId16"/>
                   </a:rPr>
                   <a:t>BollingerBand</a:t>
                 </a:r>
@@ -12677,7 +12697,7 @@
                   <a:rPr lang="en-US" sz="1200" b="1" u="sng" dirty="0">
                     <a:latin typeface="Aptos Serif" panose="02020604070405020304" pitchFamily="18" charset="0"/>
                     <a:cs typeface="Aptos Serif" panose="02020604070405020304" pitchFamily="18" charset="0"/>
-                    <a:hlinkClick r:id="rId18"/>
+                    <a:hlinkClick r:id="rId17"/>
                   </a:rPr>
                   <a:t>HurstExponentVisitor</a:t>
                 </a:r>
@@ -12806,7 +12826,7 @@
                   <a:rPr lang="en-US" sz="1200" b="1" u="sng" dirty="0">
                     <a:latin typeface="Aptos Serif" panose="02020604070405020304" pitchFamily="18" charset="0"/>
                     <a:cs typeface="Aptos Serif" panose="02020604070405020304" pitchFamily="18" charset="0"/>
-                    <a:hlinkClick r:id="rId19"/>
+                    <a:hlinkClick r:id="rId18"/>
                   </a:rPr>
                   <a:t>SharpeRatioVisitor</a:t>
                 </a:r>
@@ -12959,7 +12979,7 @@
                     </a:solidFill>
                     <a:latin typeface="Aptos Serif" panose="02020604070405020304" pitchFamily="18" charset="0"/>
                     <a:cs typeface="Aptos Serif" panose="02020604070405020304" pitchFamily="18" charset="0"/>
-                    <a:hlinkClick r:id="rId20"/>
+                    <a:hlinkClick r:id="rId19"/>
                   </a:rPr>
                   <a:t>GarmanKlassVolVisitor</a:t>
                 </a:r>
@@ -13083,7 +13103,7 @@
                   <a:rPr lang="en-US" sz="1200" b="1" u="sng" dirty="0">
                     <a:latin typeface="Aptos Serif" panose="02020604070405020304" pitchFamily="18" charset="0"/>
                     <a:cs typeface="Aptos Serif" panose="02020604070405020304" pitchFamily="18" charset="0"/>
-                    <a:hlinkClick r:id="rId21"/>
+                    <a:hlinkClick r:id="rId20"/>
                   </a:rPr>
                   <a:t>VWAPVisitor</a:t>
                 </a:r>
@@ -13221,7 +13241,7 @@
                   <a:rPr lang="en-US" sz="1200" b="1" u="sng" dirty="0">
                     <a:latin typeface="Aptos Serif" panose="02020604070405020304" pitchFamily="18" charset="0"/>
                     <a:cs typeface="Aptos Serif" panose="02020604070405020304" pitchFamily="18" charset="0"/>
-                    <a:hlinkClick r:id="rId22"/>
+                    <a:hlinkClick r:id="rId21"/>
                   </a:rPr>
                   <a:t>RSIVisitor</a:t>
                 </a:r>

</xml_diff>

<commit_message>
Implemented the supporting functions for kshape_groups()
</commit_message>
<xml_diff>
--- a/docs/CheatSheet.pptx
+++ b/docs/CheatSheet.pptx
@@ -199,7 +199,7 @@
           <a:p>
             <a:fld id="{A426CAC6-4C26-DA42-B260-CA966EDEB8DE}" type="datetimeFigureOut">
               <a:rPr lang="en-US" smtClean="0"/>
-              <a:t>7/3/25</a:t>
+              <a:t>12/19/25</a:t>
             </a:fld>
             <a:endParaRPr lang="en-US" dirty="0"/>
           </a:p>
@@ -865,7 +865,7 @@
           <a:p>
             <a:fld id="{D996798F-AFF2-4140-87AD-54D8021B772D}" type="datetimeFigureOut">
               <a:rPr lang="en-US" smtClean="0"/>
-              <a:t>7/3/25</a:t>
+              <a:t>12/19/25</a:t>
             </a:fld>
             <a:endParaRPr lang="en-US" dirty="0"/>
           </a:p>
@@ -1063,7 +1063,7 @@
           <a:p>
             <a:fld id="{D996798F-AFF2-4140-87AD-54D8021B772D}" type="datetimeFigureOut">
               <a:rPr lang="en-US" smtClean="0"/>
-              <a:t>7/3/25</a:t>
+              <a:t>12/19/25</a:t>
             </a:fld>
             <a:endParaRPr lang="en-US" dirty="0"/>
           </a:p>
@@ -1271,7 +1271,7 @@
           <a:p>
             <a:fld id="{D996798F-AFF2-4140-87AD-54D8021B772D}" type="datetimeFigureOut">
               <a:rPr lang="en-US" smtClean="0"/>
-              <a:t>7/3/25</a:t>
+              <a:t>12/19/25</a:t>
             </a:fld>
             <a:endParaRPr lang="en-US" dirty="0"/>
           </a:p>
@@ -1469,7 +1469,7 @@
           <a:p>
             <a:fld id="{D996798F-AFF2-4140-87AD-54D8021B772D}" type="datetimeFigureOut">
               <a:rPr lang="en-US" smtClean="0"/>
-              <a:t>7/3/25</a:t>
+              <a:t>12/19/25</a:t>
             </a:fld>
             <a:endParaRPr lang="en-US" dirty="0"/>
           </a:p>
@@ -1744,7 +1744,7 @@
           <a:p>
             <a:fld id="{D996798F-AFF2-4140-87AD-54D8021B772D}" type="datetimeFigureOut">
               <a:rPr lang="en-US" smtClean="0"/>
-              <a:t>7/3/25</a:t>
+              <a:t>12/19/25</a:t>
             </a:fld>
             <a:endParaRPr lang="en-US" dirty="0"/>
           </a:p>
@@ -2009,7 +2009,7 @@
           <a:p>
             <a:fld id="{D996798F-AFF2-4140-87AD-54D8021B772D}" type="datetimeFigureOut">
               <a:rPr lang="en-US" smtClean="0"/>
-              <a:t>7/3/25</a:t>
+              <a:t>12/19/25</a:t>
             </a:fld>
             <a:endParaRPr lang="en-US" dirty="0"/>
           </a:p>
@@ -2421,7 +2421,7 @@
           <a:p>
             <a:fld id="{D996798F-AFF2-4140-87AD-54D8021B772D}" type="datetimeFigureOut">
               <a:rPr lang="en-US" smtClean="0"/>
-              <a:t>7/3/25</a:t>
+              <a:t>12/19/25</a:t>
             </a:fld>
             <a:endParaRPr lang="en-US" dirty="0"/>
           </a:p>
@@ -2562,7 +2562,7 @@
           <a:p>
             <a:fld id="{D996798F-AFF2-4140-87AD-54D8021B772D}" type="datetimeFigureOut">
               <a:rPr lang="en-US" smtClean="0"/>
-              <a:t>7/3/25</a:t>
+              <a:t>12/19/25</a:t>
             </a:fld>
             <a:endParaRPr lang="en-US" dirty="0"/>
           </a:p>
@@ -2675,7 +2675,7 @@
           <a:p>
             <a:fld id="{D996798F-AFF2-4140-87AD-54D8021B772D}" type="datetimeFigureOut">
               <a:rPr lang="en-US" smtClean="0"/>
-              <a:t>7/3/25</a:t>
+              <a:t>12/19/25</a:t>
             </a:fld>
             <a:endParaRPr lang="en-US" dirty="0"/>
           </a:p>
@@ -2986,7 +2986,7 @@
           <a:p>
             <a:fld id="{D996798F-AFF2-4140-87AD-54D8021B772D}" type="datetimeFigureOut">
               <a:rPr lang="en-US" smtClean="0"/>
-              <a:t>7/3/25</a:t>
+              <a:t>12/19/25</a:t>
             </a:fld>
             <a:endParaRPr lang="en-US" dirty="0"/>
           </a:p>
@@ -3274,7 +3274,7 @@
           <a:p>
             <a:fld id="{D996798F-AFF2-4140-87AD-54D8021B772D}" type="datetimeFigureOut">
               <a:rPr lang="en-US" smtClean="0"/>
-              <a:t>7/3/25</a:t>
+              <a:t>12/19/25</a:t>
             </a:fld>
             <a:endParaRPr lang="en-US" dirty="0"/>
           </a:p>
@@ -3515,7 +3515,7 @@
           <a:p>
             <a:fld id="{D996798F-AFF2-4140-87AD-54D8021B772D}" type="datetimeFigureOut">
               <a:rPr lang="en-US" smtClean="0"/>
-              <a:t>7/3/25</a:t>
+              <a:t>12/19/25</a:t>
             </a:fld>
             <a:endParaRPr lang="en-US" dirty="0"/>
           </a:p>

</xml_diff>